<commit_message>
Correção dos arquivos para funcionamento do banco de dados. Banco funcionando e arquivos cadestrese e perfilusuario atualizados. Modificação da apresentação nos slides 7 a 14
</commit_message>
<xml_diff>
--- a/Apresentação BW (1).pptx
+++ b/Apresentação BW (1).pptx
@@ -2811,7 +2811,7 @@
           <a:p>
             <a:fld id="{9AB3A824-1A51-4B26-AD58-A6D8E14F6C04}" type="datetimeFigureOut">
               <a:rPr lang="en-US" smtClean="0"/>
-              <a:t>12/6/2020</a:t>
+              <a:t>12/11/2020</a:t>
             </a:fld>
             <a:endParaRPr lang="en-US" dirty="0"/>
           </a:p>
@@ -3014,7 +3014,7 @@
           <a:p>
             <a:fld id="{D857E33E-8B18-4087-B112-809917729534}" type="datetimeFigureOut">
               <a:rPr lang="en-US" smtClean="0"/>
-              <a:t>12/6/2020</a:t>
+              <a:t>12/11/2020</a:t>
             </a:fld>
             <a:endParaRPr lang="en-US" dirty="0"/>
           </a:p>
@@ -3227,7 +3227,7 @@
           <a:p>
             <a:fld id="{D3FFE419-2371-464F-8239-3959401C3561}" type="datetimeFigureOut">
               <a:rPr lang="en-US" smtClean="0"/>
-              <a:t>12/6/2020</a:t>
+              <a:t>12/11/2020</a:t>
             </a:fld>
             <a:endParaRPr lang="en-US" dirty="0"/>
           </a:p>
@@ -3430,7 +3430,7 @@
           <a:p>
             <a:fld id="{97D162C4-EDD9-4389-A98B-B87ECEA2A816}" type="datetimeFigureOut">
               <a:rPr lang="en-US" smtClean="0"/>
-              <a:t>12/6/2020</a:t>
+              <a:t>12/11/2020</a:t>
             </a:fld>
             <a:endParaRPr lang="en-US" dirty="0"/>
           </a:p>
@@ -3710,7 +3710,7 @@
           <a:p>
             <a:fld id="{3E5059C3-6A89-4494-99FF-5A4D6FFD50EB}" type="datetimeFigureOut">
               <a:rPr lang="en-US" smtClean="0"/>
-              <a:t>12/6/2020</a:t>
+              <a:t>12/11/2020</a:t>
             </a:fld>
             <a:endParaRPr lang="en-US" dirty="0"/>
           </a:p>
@@ -3980,7 +3980,7 @@
           <a:p>
             <a:fld id="{CA954B2F-12DE-47F5-8894-472B206D2E1E}" type="datetimeFigureOut">
               <a:rPr lang="en-US" smtClean="0"/>
-              <a:t>12/6/2020</a:t>
+              <a:t>12/11/2020</a:t>
             </a:fld>
             <a:endParaRPr lang="en-US" dirty="0"/>
           </a:p>
@@ -4397,7 +4397,7 @@
           <a:p>
             <a:fld id="{3F30E46F-7819-4ACF-B48B-48222C2ACC88}" type="datetimeFigureOut">
               <a:rPr lang="en-US" smtClean="0"/>
-              <a:t>12/6/2020</a:t>
+              <a:t>12/11/2020</a:t>
             </a:fld>
             <a:endParaRPr lang="en-US" dirty="0"/>
           </a:p>
@@ -4543,7 +4543,7 @@
           <a:p>
             <a:fld id="{1FAF3416-4057-4DAA-829D-4CA07428D088}" type="datetimeFigureOut">
               <a:rPr lang="en-US" smtClean="0"/>
-              <a:t>12/6/2020</a:t>
+              <a:t>12/11/2020</a:t>
             </a:fld>
             <a:endParaRPr lang="en-US" dirty="0"/>
           </a:p>
@@ -4661,7 +4661,7 @@
           <a:p>
             <a:fld id="{921D9284-D300-4297-87F7-E791DCC15DB1}" type="datetimeFigureOut">
               <a:rPr lang="en-US" smtClean="0"/>
-              <a:t>12/6/2020</a:t>
+              <a:t>12/11/2020</a:t>
             </a:fld>
             <a:endParaRPr lang="en-US" dirty="0"/>
           </a:p>
@@ -4977,7 +4977,7 @@
           <a:p>
             <a:fld id="{37D525BB-DA17-4BA0-B3C8-3AC3ABC827E6}" type="datetimeFigureOut">
               <a:rPr lang="en-US" smtClean="0"/>
-              <a:t>12/6/2020</a:t>
+              <a:t>12/11/2020</a:t>
             </a:fld>
             <a:endParaRPr lang="en-US" dirty="0"/>
           </a:p>
@@ -5270,7 +5270,7 @@
           <a:p>
             <a:fld id="{B16C4C9A-3960-41CF-A4E9-2A8FB932454B}" type="datetimeFigureOut">
               <a:rPr lang="en-US" smtClean="0"/>
-              <a:t>12/6/2020</a:t>
+              <a:t>12/11/2020</a:t>
             </a:fld>
             <a:endParaRPr lang="en-US" dirty="0"/>
           </a:p>
@@ -5516,7 +5516,7 @@
           <a:p>
             <a:fld id="{3CBC1C18-307B-4F68-A007-B5B542270E8D}" type="datetimeFigureOut">
               <a:rPr lang="en-US" smtClean="0"/>
-              <a:t>12/6/2020</a:t>
+              <a:t>12/11/2020</a:t>
             </a:fld>
             <a:endParaRPr lang="en-US" dirty="0"/>
           </a:p>
@@ -6755,7 +6755,7 @@
         </p:nvGrpSpPr>
         <p:grpSpPr>
           <a:xfrm>
-            <a:off x="630117" y="559490"/>
+            <a:off x="630117" y="476364"/>
             <a:ext cx="11329074" cy="1160882"/>
             <a:chOff x="630117" y="559490"/>
             <a:chExt cx="11329074" cy="1160882"/>
@@ -7013,7 +7013,31 @@
                   </a:solidFill>
                   <a:latin typeface="Helvetia"/>
                 </a:rPr>
-                <a:t>Definição das páginas da aplicação</a:t>
+                <a:t>Desenvolvimento do </a:t>
+              </a:r>
+              <a:r>
+                <a:rPr lang="pt-BR" sz="2500" i="1" dirty="0" err="1">
+                  <a:solidFill>
+                    <a:schemeClr val="tx1">
+                      <a:lumMod val="65000"/>
+                      <a:lumOff val="35000"/>
+                    </a:schemeClr>
+                  </a:solidFill>
+                  <a:latin typeface="Helvetia"/>
+                </a:rPr>
+                <a:t>frontend</a:t>
+              </a:r>
+              <a:r>
+                <a:rPr lang="pt-BR" sz="2500" dirty="0">
+                  <a:solidFill>
+                    <a:schemeClr val="tx1">
+                      <a:lumMod val="65000"/>
+                      <a:lumOff val="35000"/>
+                    </a:schemeClr>
+                  </a:solidFill>
+                  <a:latin typeface="Helvetia"/>
+                </a:rPr>
+                <a:t> </a:t>
               </a:r>
             </a:p>
           </p:txBody>
@@ -7033,7 +7057,7 @@
         </p:nvGrpSpPr>
         <p:grpSpPr>
           <a:xfrm>
-            <a:off x="594513" y="1943538"/>
+            <a:off x="594513" y="1985101"/>
             <a:ext cx="11364678" cy="1160882"/>
             <a:chOff x="594513" y="1943538"/>
             <a:chExt cx="11364678" cy="1160882"/>
@@ -7291,31 +7315,7 @@
                   </a:solidFill>
                   <a:latin typeface="Helvetia"/>
                 </a:rPr>
-                <a:t>Desenvolvimento do </a:t>
-              </a:r>
-              <a:r>
-                <a:rPr lang="pt-BR" sz="2500" i="1" dirty="0" err="1">
-                  <a:solidFill>
-                    <a:schemeClr val="tx1">
-                      <a:lumMod val="65000"/>
-                      <a:lumOff val="35000"/>
-                    </a:schemeClr>
-                  </a:solidFill>
-                  <a:latin typeface="Helvetia"/>
-                </a:rPr>
-                <a:t>frontend</a:t>
-              </a:r>
-              <a:r>
-                <a:rPr lang="pt-BR" sz="2500" dirty="0">
-                  <a:solidFill>
-                    <a:schemeClr val="tx1">
-                      <a:lumMod val="65000"/>
-                      <a:lumOff val="35000"/>
-                    </a:schemeClr>
-                  </a:solidFill>
-                  <a:latin typeface="Helvetia"/>
-                </a:rPr>
-                <a:t> </a:t>
+                <a:t>Modelagem dos dados</a:t>
               </a:r>
             </a:p>
           </p:txBody>
@@ -7593,8 +7593,29 @@
                   </a:solidFill>
                   <a:latin typeface="Helvetia"/>
                 </a:rPr>
-                <a:t>Modelagem dos dados</a:t>
+                <a:t>Desenvolvimento do </a:t>
               </a:r>
+              <a:r>
+                <a:rPr lang="pt-BR" sz="2500" i="1" dirty="0" err="1">
+                  <a:solidFill>
+                    <a:schemeClr val="tx1">
+                      <a:lumMod val="65000"/>
+                      <a:lumOff val="35000"/>
+                    </a:schemeClr>
+                  </a:solidFill>
+                  <a:latin typeface="Helvetia"/>
+                </a:rPr>
+                <a:t>backend</a:t>
+              </a:r>
+              <a:endParaRPr lang="pt-BR" sz="2500" dirty="0">
+                <a:solidFill>
+                  <a:schemeClr val="tx1">
+                    <a:lumMod val="65000"/>
+                    <a:lumOff val="35000"/>
+                  </a:schemeClr>
+                </a:solidFill>
+                <a:latin typeface="Helvetia"/>
+              </a:endParaRPr>
             </a:p>
           </p:txBody>
         </p:sp>
@@ -7862,7 +7883,7 @@
             <a:lstStyle/>
             <a:p>
               <a:r>
-                <a:rPr lang="pt-BR" sz="2500" dirty="0">
+                <a:rPr lang="pt-BR" sz="2500" i="1" dirty="0">
                   <a:solidFill>
                     <a:schemeClr val="tx1">
                       <a:lumMod val="65000"/>
@@ -7871,7 +7892,7 @@
                   </a:solidFill>
                   <a:latin typeface="Helvetia"/>
                 </a:rPr>
-                <a:t>Desenvolvimento do </a:t>
+                <a:t>Futuro: </a:t>
               </a:r>
               <a:r>
                 <a:rPr lang="pt-BR" sz="2500" i="1" dirty="0" err="1">
@@ -7883,32 +7904,17 @@
                   </a:solidFill>
                   <a:latin typeface="Helvetia"/>
                 </a:rPr>
-                <a:t>backend</a:t>
+                <a:t>refatoração</a:t>
               </a:r>
-              <a:r>
-                <a:rPr lang="pt-BR" sz="2500" dirty="0">
-                  <a:solidFill>
-                    <a:schemeClr val="tx1">
-                      <a:lumMod val="65000"/>
-                      <a:lumOff val="35000"/>
-                    </a:schemeClr>
-                  </a:solidFill>
-                  <a:latin typeface="Helvetia"/>
-                </a:rPr>
-                <a:t> e reconstrução do </a:t>
-              </a:r>
-              <a:r>
-                <a:rPr lang="pt-BR" sz="2500" i="1" dirty="0">
-                  <a:solidFill>
-                    <a:schemeClr val="tx1">
-                      <a:lumMod val="65000"/>
-                      <a:lumOff val="35000"/>
-                    </a:schemeClr>
-                  </a:solidFill>
-                  <a:latin typeface="Helvetia"/>
-                </a:rPr>
-                <a:t>front</a:t>
-              </a:r>
+              <a:endParaRPr lang="pt-BR" sz="2500" i="1" dirty="0">
+                <a:solidFill>
+                  <a:schemeClr val="tx1">
+                    <a:lumMod val="65000"/>
+                    <a:lumOff val="35000"/>
+                  </a:schemeClr>
+                </a:solidFill>
+                <a:latin typeface="Helvetia"/>
+              </a:endParaRPr>
             </a:p>
           </p:txBody>
         </p:sp>
@@ -9076,7 +9082,7 @@
                   </a:solidFill>
                   <a:latin typeface="Helvetia"/>
                 </a:rPr>
-                <a:t>Degugando</a:t>
+                <a:t>Debugando</a:t>
               </a:r>
               <a:r>
                 <a:rPr lang="pt-BR" sz="2500" dirty="0">
@@ -9116,7 +9122,7 @@
         </p:blipFill>
         <p:spPr>
           <a:xfrm>
-            <a:off x="3841140" y="1786194"/>
+            <a:off x="3841140" y="1827757"/>
             <a:ext cx="4509720" cy="4509720"/>
           </a:xfrm>
           <a:prstGeom prst="rect">
@@ -19739,7 +19745,7 @@
                   </a:solidFill>
                   <a:latin typeface="Helvetia"/>
                 </a:rPr>
-                <a:t>Testando e sofrendo...</a:t>
+                <a:t>Testando e aprendendo...</a:t>
               </a:r>
             </a:p>
           </p:txBody>
@@ -21011,7 +21017,7 @@
                   </a:solidFill>
                   <a:latin typeface="Helvetia"/>
                 </a:rPr>
-                <a:t>Ajustes no tipo de negócio e requisitos</a:t>
+                <a:t>Definição das páginas da aplicação</a:t>
               </a:r>
             </a:p>
           </p:txBody>

</xml_diff>